<commit_message>
Modificación 1 presentación Power Point
</commit_message>
<xml_diff>
--- a/La Casa del Te (presentacion).pptx
+++ b/La Casa del Te (presentacion).pptx
@@ -10,6 +10,10 @@
     <p:sldId id="258" r:id="rId4"/>
     <p:sldId id="260" r:id="rId5"/>
     <p:sldId id="259" r:id="rId6"/>
+    <p:sldId id="263" r:id="rId7"/>
+    <p:sldId id="262" r:id="rId8"/>
+    <p:sldId id="261" r:id="rId9"/>
+    <p:sldId id="264" r:id="rId10"/>
   </p:sldIdLst>
   <p:sldSz cx="12192000" cy="6858000"/>
   <p:notesSz cx="6858000" cy="9144000"/>
@@ -108,13 +112,18 @@
       </a:defRPr>
     </a:lvl9pPr>
   </p:defaultTextStyle>
+  <p:extLst>
+    <p:ext uri="{EFAFB233-063F-42B5-8137-9DF3F51BA10A}">
+      <p15:sldGuideLst xmlns:p15="http://schemas.microsoft.com/office/powerpoint/2012/main"/>
+    </p:ext>
+  </p:extLst>
 </p:presentation>
 </file>
 
 <file path=ppt/revisionInfo.xml><?xml version="1.0" encoding="utf-8"?>
 <p1510:revInfo xmlns:a="http://schemas.openxmlformats.org/drawingml/2006/main" xmlns:r="http://schemas.openxmlformats.org/officeDocument/2006/relationships" xmlns:p1510="http://schemas.microsoft.com/office/powerpoint/2015/10/main">
   <p1510:revLst>
-    <p1510:client id="{BC12AC5C-A649-46DE-923D-53C108626086}" v="2" dt="2024-12-09T19:09:54.120"/>
+    <p1510:client id="{BC12AC5C-A649-46DE-923D-53C108626086}" v="14" dt="2024-12-11T05:08:19.236"/>
   </p1510:revLst>
 </p1510:revInfo>
 </file>
@@ -123,11 +132,178 @@
 <pc:chgInfo xmlns:a="http://schemas.openxmlformats.org/drawingml/2006/main" xmlns:r="http://schemas.openxmlformats.org/officeDocument/2006/relationships" xmlns:ac="http://schemas.microsoft.com/office/drawing/2013/main/command" xmlns:pc="http://schemas.microsoft.com/office/powerpoint/2013/main/command">
   <pc:docChgLst>
     <pc:chgData name="Claudia Maritza Santibañez Garcia" userId="0c03d681a8b9b11e" providerId="LiveId" clId="{BC12AC5C-A649-46DE-923D-53C108626086}"/>
-    <pc:docChg chg="undo custSel modSld">
-      <pc:chgData name="Claudia Maritza Santibañez Garcia" userId="0c03d681a8b9b11e" providerId="LiveId" clId="{BC12AC5C-A649-46DE-923D-53C108626086}" dt="2024-12-09T19:26:22.108" v="41" actId="1076"/>
+    <pc:docChg chg="undo custSel addSld delSld modSld sldOrd">
+      <pc:chgData name="Claudia Maritza Santibañez Garcia" userId="0c03d681a8b9b11e" providerId="LiveId" clId="{BC12AC5C-A649-46DE-923D-53C108626086}" dt="2024-12-11T05:08:25.200" v="277" actId="1076"/>
       <pc:docMkLst>
         <pc:docMk/>
       </pc:docMkLst>
+      <pc:sldChg chg="addSp delSp modSp mod">
+        <pc:chgData name="Claudia Maritza Santibañez Garcia" userId="0c03d681a8b9b11e" providerId="LiveId" clId="{BC12AC5C-A649-46DE-923D-53C108626086}" dt="2024-12-11T05:08:25.200" v="277" actId="1076"/>
+        <pc:sldMkLst>
+          <pc:docMk/>
+          <pc:sldMk cId="3139710169" sldId="256"/>
+        </pc:sldMkLst>
+        <pc:spChg chg="mod">
+          <ac:chgData name="Claudia Maritza Santibañez Garcia" userId="0c03d681a8b9b11e" providerId="LiveId" clId="{BC12AC5C-A649-46DE-923D-53C108626086}" dt="2024-12-11T05:08:09.635" v="273" actId="26606"/>
+          <ac:spMkLst>
+            <pc:docMk/>
+            <pc:sldMk cId="3139710169" sldId="256"/>
+            <ac:spMk id="2" creationId="{9E6C3186-7C5A-64AF-B011-80F2A2C01ADB}"/>
+          </ac:spMkLst>
+        </pc:spChg>
+        <pc:spChg chg="mod">
+          <ac:chgData name="Claudia Maritza Santibañez Garcia" userId="0c03d681a8b9b11e" providerId="LiveId" clId="{BC12AC5C-A649-46DE-923D-53C108626086}" dt="2024-12-11T05:08:25.200" v="277" actId="1076"/>
+          <ac:spMkLst>
+            <pc:docMk/>
+            <pc:sldMk cId="3139710169" sldId="256"/>
+            <ac:spMk id="3" creationId="{E4306B3A-95E5-BC4D-8CBA-51EB4E9EEF1E}"/>
+          </ac:spMkLst>
+        </pc:spChg>
+        <pc:spChg chg="add">
+          <ac:chgData name="Claudia Maritza Santibañez Garcia" userId="0c03d681a8b9b11e" providerId="LiveId" clId="{BC12AC5C-A649-46DE-923D-53C108626086}" dt="2024-12-11T05:06:41.503" v="259"/>
+          <ac:spMkLst>
+            <pc:docMk/>
+            <pc:sldMk cId="3139710169" sldId="256"/>
+            <ac:spMk id="5" creationId="{E9C43328-0DC2-75B2-60C7-59F0045085E1}"/>
+          </ac:spMkLst>
+        </pc:spChg>
+        <pc:spChg chg="add del">
+          <ac:chgData name="Claudia Maritza Santibañez Garcia" userId="0c03d681a8b9b11e" providerId="LiveId" clId="{BC12AC5C-A649-46DE-923D-53C108626086}" dt="2024-12-11T05:08:09.635" v="273" actId="26606"/>
+          <ac:spMkLst>
+            <pc:docMk/>
+            <pc:sldMk cId="3139710169" sldId="256"/>
+            <ac:spMk id="9" creationId="{733E0473-C315-42D8-A82A-A2FE49DC67DA}"/>
+          </ac:spMkLst>
+        </pc:spChg>
+        <pc:spChg chg="add del">
+          <ac:chgData name="Claudia Maritza Santibañez Garcia" userId="0c03d681a8b9b11e" providerId="LiveId" clId="{BC12AC5C-A649-46DE-923D-53C108626086}" dt="2024-12-11T05:08:09.635" v="273" actId="26606"/>
+          <ac:spMkLst>
+            <pc:docMk/>
+            <pc:sldMk cId="3139710169" sldId="256"/>
+            <ac:spMk id="11" creationId="{AD23A251-68F2-43E5-812B-4BBAE1AF535E}"/>
+          </ac:spMkLst>
+        </pc:spChg>
+        <pc:spChg chg="add del">
+          <ac:chgData name="Claudia Maritza Santibañez Garcia" userId="0c03d681a8b9b11e" providerId="LiveId" clId="{BC12AC5C-A649-46DE-923D-53C108626086}" dt="2024-12-11T05:08:09.635" v="273" actId="26606"/>
+          <ac:spMkLst>
+            <pc:docMk/>
+            <pc:sldMk cId="3139710169" sldId="256"/>
+            <ac:spMk id="1033" creationId="{99B5B3C5-A599-465B-B2B9-866E8B2087CE}"/>
+          </ac:spMkLst>
+        </pc:spChg>
+        <pc:spChg chg="add del">
+          <ac:chgData name="Claudia Maritza Santibañez Garcia" userId="0c03d681a8b9b11e" providerId="LiveId" clId="{BC12AC5C-A649-46DE-923D-53C108626086}" dt="2024-12-11T05:08:09.635" v="273" actId="26606"/>
+          <ac:spMkLst>
+            <pc:docMk/>
+            <pc:sldMk cId="3139710169" sldId="256"/>
+            <ac:spMk id="1035" creationId="{25C84982-7DD0-43B1-8A2D-BFA4DF1B4E60}"/>
+          </ac:spMkLst>
+        </pc:spChg>
+        <pc:spChg chg="add del">
+          <ac:chgData name="Claudia Maritza Santibañez Garcia" userId="0c03d681a8b9b11e" providerId="LiveId" clId="{BC12AC5C-A649-46DE-923D-53C108626086}" dt="2024-12-11T05:08:09.635" v="273" actId="26606"/>
+          <ac:spMkLst>
+            <pc:docMk/>
+            <pc:sldMk cId="3139710169" sldId="256"/>
+            <ac:spMk id="1054" creationId="{FA0FD7B3-91A4-4D8A-BC47-836A8F91012A}"/>
+          </ac:spMkLst>
+        </pc:spChg>
+        <pc:spChg chg="add del">
+          <ac:chgData name="Claudia Maritza Santibañez Garcia" userId="0c03d681a8b9b11e" providerId="LiveId" clId="{BC12AC5C-A649-46DE-923D-53C108626086}" dt="2024-12-11T05:08:09.635" v="273" actId="26606"/>
+          <ac:spMkLst>
+            <pc:docMk/>
+            <pc:sldMk cId="3139710169" sldId="256"/>
+            <ac:spMk id="1056" creationId="{CE9AE04B-583C-4D8E-8307-D368EC5CC4A9}"/>
+          </ac:spMkLst>
+        </pc:spChg>
+        <pc:spChg chg="add del">
+          <ac:chgData name="Claudia Maritza Santibañez Garcia" userId="0c03d681a8b9b11e" providerId="LiveId" clId="{BC12AC5C-A649-46DE-923D-53C108626086}" dt="2024-12-11T05:08:09.635" v="273" actId="26606"/>
+          <ac:spMkLst>
+            <pc:docMk/>
+            <pc:sldMk cId="3139710169" sldId="256"/>
+            <ac:spMk id="1068" creationId="{D53977F0-61A4-468D-9F48-2BD14D1BF0CC}"/>
+          </ac:spMkLst>
+        </pc:spChg>
+        <pc:spChg chg="add del">
+          <ac:chgData name="Claudia Maritza Santibañez Garcia" userId="0c03d681a8b9b11e" providerId="LiveId" clId="{BC12AC5C-A649-46DE-923D-53C108626086}" dt="2024-12-11T05:08:09.635" v="273" actId="26606"/>
+          <ac:spMkLst>
+            <pc:docMk/>
+            <pc:sldMk cId="3139710169" sldId="256"/>
+            <ac:spMk id="1070" creationId="{AE82D2DD-73F4-4C2D-91CB-269A32D36799}"/>
+          </ac:spMkLst>
+        </pc:spChg>
+        <pc:spChg chg="add del">
+          <ac:chgData name="Claudia Maritza Santibañez Garcia" userId="0c03d681a8b9b11e" providerId="LiveId" clId="{BC12AC5C-A649-46DE-923D-53C108626086}" dt="2024-12-11T05:08:09.635" v="273" actId="26606"/>
+          <ac:spMkLst>
+            <pc:docMk/>
+            <pc:sldMk cId="3139710169" sldId="256"/>
+            <ac:spMk id="1072" creationId="{02BB7DB3-0D0B-4561-96C3-5CEFEA16FE5A}"/>
+          </ac:spMkLst>
+        </pc:spChg>
+        <pc:spChg chg="add del">
+          <ac:chgData name="Claudia Maritza Santibañez Garcia" userId="0c03d681a8b9b11e" providerId="LiveId" clId="{BC12AC5C-A649-46DE-923D-53C108626086}" dt="2024-12-11T05:08:09.635" v="273" actId="26606"/>
+          <ac:spMkLst>
+            <pc:docMk/>
+            <pc:sldMk cId="3139710169" sldId="256"/>
+            <ac:spMk id="1076" creationId="{E6CD47EF-46D2-492B-9BF4-5FB4C41A8911}"/>
+          </ac:spMkLst>
+        </pc:spChg>
+        <pc:grpChg chg="add del">
+          <ac:chgData name="Claudia Maritza Santibañez Garcia" userId="0c03d681a8b9b11e" providerId="LiveId" clId="{BC12AC5C-A649-46DE-923D-53C108626086}" dt="2024-12-11T05:08:09.635" v="273" actId="26606"/>
+          <ac:grpSpMkLst>
+            <pc:docMk/>
+            <pc:sldMk cId="3139710169" sldId="256"/>
+            <ac:grpSpMk id="13" creationId="{0350AF23-2606-421F-AB7B-23D9B48F3E9B}"/>
+          </ac:grpSpMkLst>
+        </pc:grpChg>
+        <pc:grpChg chg="add del">
+          <ac:chgData name="Claudia Maritza Santibañez Garcia" userId="0c03d681a8b9b11e" providerId="LiveId" clId="{BC12AC5C-A649-46DE-923D-53C108626086}" dt="2024-12-11T05:08:09.635" v="273" actId="26606"/>
+          <ac:grpSpMkLst>
+            <pc:docMk/>
+            <pc:sldMk cId="3139710169" sldId="256"/>
+            <ac:grpSpMk id="1037" creationId="{1D912E1C-3BBA-42F0-A3EE-FEC382E7230A}"/>
+          </ac:grpSpMkLst>
+        </pc:grpChg>
+        <pc:grpChg chg="add del">
+          <ac:chgData name="Claudia Maritza Santibañez Garcia" userId="0c03d681a8b9b11e" providerId="LiveId" clId="{BC12AC5C-A649-46DE-923D-53C108626086}" dt="2024-12-11T05:08:09.635" v="273" actId="26606"/>
+          <ac:grpSpMkLst>
+            <pc:docMk/>
+            <pc:sldMk cId="3139710169" sldId="256"/>
+            <ac:grpSpMk id="1058" creationId="{9EFE4F72-2DE0-4C49-ACAE-4169EB1533E4}"/>
+          </ac:grpSpMkLst>
+        </pc:grpChg>
+        <pc:picChg chg="mod ord">
+          <ac:chgData name="Claudia Maritza Santibañez Garcia" userId="0c03d681a8b9b11e" providerId="LiveId" clId="{BC12AC5C-A649-46DE-923D-53C108626086}" dt="2024-12-11T05:08:09.635" v="273" actId="26606"/>
+          <ac:picMkLst>
+            <pc:docMk/>
+            <pc:sldMk cId="3139710169" sldId="256"/>
+            <ac:picMk id="4" creationId="{BA2B71C4-5F31-3C5B-DA55-AF7E06BFE9E3}"/>
+          </ac:picMkLst>
+        </pc:picChg>
+        <pc:picChg chg="add mod">
+          <ac:chgData name="Claudia Maritza Santibañez Garcia" userId="0c03d681a8b9b11e" providerId="LiveId" clId="{BC12AC5C-A649-46DE-923D-53C108626086}" dt="2024-12-11T05:08:09.635" v="273" actId="26606"/>
+          <ac:picMkLst>
+            <pc:docMk/>
+            <pc:sldMk cId="3139710169" sldId="256"/>
+            <ac:picMk id="6" creationId="{808B1F65-F611-7525-8175-0BA0265F4D86}"/>
+          </ac:picMkLst>
+        </pc:picChg>
+        <pc:picChg chg="add mod ord">
+          <ac:chgData name="Claudia Maritza Santibañez Garcia" userId="0c03d681a8b9b11e" providerId="LiveId" clId="{BC12AC5C-A649-46DE-923D-53C108626086}" dt="2024-12-11T05:08:19.236" v="276" actId="1076"/>
+          <ac:picMkLst>
+            <pc:docMk/>
+            <pc:sldMk cId="3139710169" sldId="256"/>
+            <ac:picMk id="1028" creationId="{00C43ED9-1FC8-4573-C22D-CF566D28EB04}"/>
+          </ac:picMkLst>
+        </pc:picChg>
+        <pc:picChg chg="add del">
+          <ac:chgData name="Claudia Maritza Santibañez Garcia" userId="0c03d681a8b9b11e" providerId="LiveId" clId="{BC12AC5C-A649-46DE-923D-53C108626086}" dt="2024-12-11T05:08:09.635" v="273" actId="26606"/>
+          <ac:picMkLst>
+            <pc:docMk/>
+            <pc:sldMk cId="3139710169" sldId="256"/>
+            <ac:picMk id="1074" creationId="{7AECCF88-D1A6-40E1-AA8C-92A2061A8DBF}"/>
+          </ac:picMkLst>
+        </pc:picChg>
+      </pc:sldChg>
       <pc:sldChg chg="addSp delSp modSp mod setBg addAnim delAnim">
         <pc:chgData name="Claudia Maritza Santibañez Garcia" userId="0c03d681a8b9b11e" providerId="LiveId" clId="{BC12AC5C-A649-46DE-923D-53C108626086}" dt="2024-12-09T19:26:22.108" v="41" actId="1076"/>
         <pc:sldMkLst>
@@ -310,6 +486,106 @@
           </ac:spMkLst>
         </pc:spChg>
       </pc:sldChg>
+      <pc:sldChg chg="addSp delSp modSp new mod">
+        <pc:chgData name="Claudia Maritza Santibañez Garcia" userId="0c03d681a8b9b11e" providerId="LiveId" clId="{BC12AC5C-A649-46DE-923D-53C108626086}" dt="2024-12-11T05:01:27.258" v="167" actId="1076"/>
+        <pc:sldMkLst>
+          <pc:docMk/>
+          <pc:sldMk cId="3021259750" sldId="261"/>
+        </pc:sldMkLst>
+        <pc:spChg chg="mod">
+          <ac:chgData name="Claudia Maritza Santibañez Garcia" userId="0c03d681a8b9b11e" providerId="LiveId" clId="{BC12AC5C-A649-46DE-923D-53C108626086}" dt="2024-12-11T05:01:20.936" v="164" actId="1076"/>
+          <ac:spMkLst>
+            <pc:docMk/>
+            <pc:sldMk cId="3021259750" sldId="261"/>
+            <ac:spMk id="2" creationId="{CFE054AA-D6C6-AB97-FC05-5259E4362795}"/>
+          </ac:spMkLst>
+        </pc:spChg>
+        <pc:spChg chg="del">
+          <ac:chgData name="Claudia Maritza Santibañez Garcia" userId="0c03d681a8b9b11e" providerId="LiveId" clId="{BC12AC5C-A649-46DE-923D-53C108626086}" dt="2024-12-11T04:57:38.910" v="83" actId="478"/>
+          <ac:spMkLst>
+            <pc:docMk/>
+            <pc:sldMk cId="3021259750" sldId="261"/>
+            <ac:spMk id="3" creationId="{67DD1C87-9305-361B-08F5-D0D567378CA5}"/>
+          </ac:spMkLst>
+        </pc:spChg>
+        <pc:picChg chg="add mod">
+          <ac:chgData name="Claudia Maritza Santibañez Garcia" userId="0c03d681a8b9b11e" providerId="LiveId" clId="{BC12AC5C-A649-46DE-923D-53C108626086}" dt="2024-12-11T05:01:27.258" v="167" actId="1076"/>
+          <ac:picMkLst>
+            <pc:docMk/>
+            <pc:sldMk cId="3021259750" sldId="261"/>
+            <ac:picMk id="5" creationId="{CB96B4A9-7AB4-A0AF-7821-B4D439747AA8}"/>
+          </ac:picMkLst>
+        </pc:picChg>
+      </pc:sldChg>
+      <pc:sldChg chg="addSp delSp modSp new mod">
+        <pc:chgData name="Claudia Maritza Santibañez Garcia" userId="0c03d681a8b9b11e" providerId="LiveId" clId="{BC12AC5C-A649-46DE-923D-53C108626086}" dt="2024-12-11T05:01:55.624" v="176" actId="1076"/>
+        <pc:sldMkLst>
+          <pc:docMk/>
+          <pc:sldMk cId="3226838017" sldId="262"/>
+        </pc:sldMkLst>
+        <pc:spChg chg="mod">
+          <ac:chgData name="Claudia Maritza Santibañez Garcia" userId="0c03d681a8b9b11e" providerId="LiveId" clId="{BC12AC5C-A649-46DE-923D-53C108626086}" dt="2024-12-11T05:01:34.802" v="169" actId="1076"/>
+          <ac:spMkLst>
+            <pc:docMk/>
+            <pc:sldMk cId="3226838017" sldId="262"/>
+            <ac:spMk id="2" creationId="{AF9A4D78-E717-8A56-63CF-BB70A04A3439}"/>
+          </ac:spMkLst>
+        </pc:spChg>
+        <pc:spChg chg="del">
+          <ac:chgData name="Claudia Maritza Santibañez Garcia" userId="0c03d681a8b9b11e" providerId="LiveId" clId="{BC12AC5C-A649-46DE-923D-53C108626086}" dt="2024-12-11T04:57:51.493" v="123" actId="478"/>
+          <ac:spMkLst>
+            <pc:docMk/>
+            <pc:sldMk cId="3226838017" sldId="262"/>
+            <ac:spMk id="3" creationId="{77B07544-A40E-8E4C-B8BD-232ADE9ED67D}"/>
+          </ac:spMkLst>
+        </pc:spChg>
+        <pc:picChg chg="add mod">
+          <ac:chgData name="Claudia Maritza Santibañez Garcia" userId="0c03d681a8b9b11e" providerId="LiveId" clId="{BC12AC5C-A649-46DE-923D-53C108626086}" dt="2024-12-11T05:01:55.624" v="176" actId="1076"/>
+          <ac:picMkLst>
+            <pc:docMk/>
+            <pc:sldMk cId="3226838017" sldId="262"/>
+            <ac:picMk id="5" creationId="{0C80641C-1B45-A71B-D57B-5A7D2B2F0A00}"/>
+          </ac:picMkLst>
+        </pc:picChg>
+      </pc:sldChg>
+      <pc:sldChg chg="addSp delSp modSp new mod ord">
+        <pc:chgData name="Claudia Maritza Santibañez Garcia" userId="0c03d681a8b9b11e" providerId="LiveId" clId="{BC12AC5C-A649-46DE-923D-53C108626086}" dt="2024-12-11T05:00:51.349" v="157" actId="1076"/>
+        <pc:sldMkLst>
+          <pc:docMk/>
+          <pc:sldMk cId="4239439275" sldId="263"/>
+        </pc:sldMkLst>
+        <pc:spChg chg="mod">
+          <ac:chgData name="Claudia Maritza Santibañez Garcia" userId="0c03d681a8b9b11e" providerId="LiveId" clId="{BC12AC5C-A649-46DE-923D-53C108626086}" dt="2024-12-11T05:00:43.009" v="154" actId="1076"/>
+          <ac:spMkLst>
+            <pc:docMk/>
+            <pc:sldMk cId="4239439275" sldId="263"/>
+            <ac:spMk id="2" creationId="{944ABC48-E922-D0E3-9CD7-CE98C240858E}"/>
+          </ac:spMkLst>
+        </pc:spChg>
+        <pc:spChg chg="del">
+          <ac:chgData name="Claudia Maritza Santibañez Garcia" userId="0c03d681a8b9b11e" providerId="LiveId" clId="{BC12AC5C-A649-46DE-923D-53C108626086}" dt="2024-12-11T04:58:04.012" v="143" actId="478"/>
+          <ac:spMkLst>
+            <pc:docMk/>
+            <pc:sldMk cId="4239439275" sldId="263"/>
+            <ac:spMk id="3" creationId="{8FD84D13-0019-5F61-3D1B-78C0FFD469FC}"/>
+          </ac:spMkLst>
+        </pc:spChg>
+        <pc:picChg chg="add mod">
+          <ac:chgData name="Claudia Maritza Santibañez Garcia" userId="0c03d681a8b9b11e" providerId="LiveId" clId="{BC12AC5C-A649-46DE-923D-53C108626086}" dt="2024-12-11T05:00:51.349" v="157" actId="1076"/>
+          <ac:picMkLst>
+            <pc:docMk/>
+            <pc:sldMk cId="4239439275" sldId="263"/>
+            <ac:picMk id="5" creationId="{773CB2B1-46FC-940A-7D9A-3D24B7D691C6}"/>
+          </ac:picMkLst>
+        </pc:picChg>
+      </pc:sldChg>
+      <pc:sldChg chg="new del">
+        <pc:chgData name="Claudia Maritza Santibañez Garcia" userId="0c03d681a8b9b11e" providerId="LiveId" clId="{BC12AC5C-A649-46DE-923D-53C108626086}" dt="2024-12-11T05:03:52.806" v="178" actId="2696"/>
+        <pc:sldMkLst>
+          <pc:docMk/>
+          <pc:sldMk cId="3998478006" sldId="264"/>
+        </pc:sldMkLst>
+      </pc:sldChg>
     </pc:docChg>
   </pc:docChgLst>
 </pc:chgInfo>
@@ -464,7 +740,7 @@
           <a:p>
             <a:fld id="{C43A76A3-ADC8-4477-8FC1-B9DD55D84908}" type="datetime1">
               <a:rPr lang="en-US" smtClean="0"/>
-              <a:t>12/9/2024</a:t>
+              <a:t>12/11/2024</a:t>
             </a:fld>
             <a:endParaRPr lang="en-US" dirty="0"/>
           </a:p>
@@ -662,7 +938,7 @@
           <a:p>
             <a:fld id="{D6762538-DC4D-4667-96E5-B3278DDF8B12}" type="datetime1">
               <a:rPr lang="en-US" smtClean="0"/>
-              <a:t>12/9/2024</a:t>
+              <a:t>12/11/2024</a:t>
             </a:fld>
             <a:endParaRPr lang="en-US"/>
           </a:p>
@@ -870,7 +1146,7 @@
           <a:p>
             <a:fld id="{05880548-5C08-4BE3-B63E-F2BB63B0B00C}" type="datetime1">
               <a:rPr lang="en-US" smtClean="0"/>
-              <a:t>12/9/2024</a:t>
+              <a:t>12/11/2024</a:t>
             </a:fld>
             <a:endParaRPr lang="en-US"/>
           </a:p>
@@ -1068,7 +1344,7 @@
           <a:p>
             <a:fld id="{DE7F49BE-398D-479A-8A7E-5DDBCA61EDCB}" type="datetime1">
               <a:rPr lang="en-US" smtClean="0"/>
-              <a:t>12/9/2024</a:t>
+              <a:t>12/11/2024</a:t>
             </a:fld>
             <a:endParaRPr lang="en-US"/>
           </a:p>
@@ -1344,7 +1620,7 @@
           <a:p>
             <a:fld id="{CCD0C193-4974-4A1F-9C63-07D595E30D66}" type="datetime1">
               <a:rPr lang="en-US" smtClean="0"/>
-              <a:t>12/9/2024</a:t>
+              <a:t>12/11/2024</a:t>
             </a:fld>
             <a:endParaRPr lang="en-US"/>
           </a:p>
@@ -1611,7 +1887,7 @@
           <a:p>
             <a:fld id="{701AA87F-28D4-4BF0-B81F-877A89DFD5AC}" type="datetime1">
               <a:rPr lang="en-US" smtClean="0"/>
-              <a:t>12/9/2024</a:t>
+              <a:t>12/11/2024</a:t>
             </a:fld>
             <a:endParaRPr lang="en-US"/>
           </a:p>
@@ -2025,7 +2301,7 @@
           <a:p>
             <a:fld id="{A8A9F1F3-208B-49A3-B337-9C8ACEB3E0E1}" type="datetime1">
               <a:rPr lang="en-US" smtClean="0"/>
-              <a:t>12/9/2024</a:t>
+              <a:t>12/11/2024</a:t>
             </a:fld>
             <a:endParaRPr lang="en-US"/>
           </a:p>
@@ -2172,7 +2448,7 @@
           <a:p>
             <a:fld id="{27AF6CA6-7293-4AA2-A0E0-A3BF4416E786}" type="datetime1">
               <a:rPr lang="en-US" smtClean="0"/>
-              <a:t>12/9/2024</a:t>
+              <a:t>12/11/2024</a:t>
             </a:fld>
             <a:endParaRPr lang="en-US"/>
           </a:p>
@@ -2285,7 +2561,7 @@
           <a:p>
             <a:fld id="{98D87016-7BCD-46FB-8EE3-AB6C369108B4}" type="datetime1">
               <a:rPr lang="en-US" smtClean="0"/>
-              <a:t>12/9/2024</a:t>
+              <a:t>12/11/2024</a:t>
             </a:fld>
             <a:endParaRPr lang="en-US"/>
           </a:p>
@@ -2604,7 +2880,7 @@
           <a:p>
             <a:fld id="{A1547011-1FFC-4EF8-9A2E-53B4AD2ADBD4}" type="datetime1">
               <a:rPr lang="en-US" smtClean="0"/>
-              <a:t>12/9/2024</a:t>
+              <a:t>12/11/2024</a:t>
             </a:fld>
             <a:endParaRPr lang="en-US"/>
           </a:p>
@@ -2899,7 +3175,7 @@
           <a:p>
             <a:fld id="{9562EB47-45B4-4EF5-A743-B4885DD2F060}" type="datetime1">
               <a:rPr lang="en-US" smtClean="0"/>
-              <a:t>12/9/2024</a:t>
+              <a:t>12/11/2024</a:t>
             </a:fld>
             <a:endParaRPr lang="en-US"/>
           </a:p>
@@ -4284,7 +4560,7 @@
           <a:p>
             <a:fld id="{4A8D24A4-5FEC-4062-8995-EB21925B3B40}" type="datetime1">
               <a:rPr lang="en-US" smtClean="0"/>
-              <a:t>12/9/2024</a:t>
+              <a:t>12/11/2024</a:t>
             </a:fld>
             <a:endParaRPr lang="en-US" sz="1000" dirty="0"/>
           </a:p>
@@ -5004,6 +5280,16 @@
           <a:prstGeom prst="rect">
             <a:avLst/>
           </a:prstGeom>
+          <a:ln>
+            <a:noFill/>
+          </a:ln>
+          <a:effectLst>
+            <a:outerShdw blurRad="292100" dist="139700" dir="2700000" algn="tl" rotWithShape="0">
+              <a:srgbClr val="333333">
+                <a:alpha val="65000"/>
+              </a:srgbClr>
+            </a:outerShdw>
+          </a:effectLst>
         </p:spPr>
       </p:pic>
       <p:grpSp>
@@ -5556,25 +5842,25 @@
         </p:nvSpPr>
         <p:spPr>
           <a:xfrm>
-            <a:off x="2562605" y="1209323"/>
+            <a:off x="2562606" y="461699"/>
             <a:ext cx="7063739" cy="781753"/>
           </a:xfrm>
         </p:spPr>
         <p:txBody>
           <a:bodyPr>
-            <a:normAutofit fontScale="90000"/>
+            <a:noAutofit/>
           </a:bodyPr>
           <a:lstStyle/>
           <a:p>
             <a:r>
-              <a:rPr lang="es-ES" dirty="0">
+              <a:rPr lang="es-ES" sz="5500">
                 <a:solidFill>
                   <a:srgbClr val="FFFFFF"/>
                 </a:solidFill>
               </a:rPr>
               <a:t>La Casa del Té</a:t>
             </a:r>
-            <a:endParaRPr lang="es-MX" dirty="0">
+            <a:endParaRPr lang="es-MX" sz="5500" dirty="0">
               <a:solidFill>
                 <a:srgbClr val="FFFFFF"/>
               </a:solidFill>
@@ -5600,8 +5886,8 @@
         </p:nvSpPr>
         <p:spPr>
           <a:xfrm>
-            <a:off x="2562606" y="3602038"/>
-            <a:ext cx="7063739" cy="1655762"/>
+            <a:off x="2562605" y="3996836"/>
+            <a:ext cx="7063739" cy="3487892"/>
           </a:xfrm>
         </p:spPr>
         <p:txBody>
@@ -5638,6 +5924,35 @@
               </a:rPr>
               <a:t>Miguel Ángel Romero Barajas</a:t>
             </a:r>
+          </a:p>
+          <a:p>
+            <a:endParaRPr lang="es-ES" dirty="0">
+              <a:solidFill>
+                <a:srgbClr val="FFFFFF"/>
+              </a:solidFill>
+            </a:endParaRPr>
+          </a:p>
+          <a:p>
+            <a:r>
+              <a:rPr lang="es-ES" dirty="0">
+                <a:solidFill>
+                  <a:srgbClr val="FFFFFF"/>
+                </a:solidFill>
+              </a:rPr>
+              <a:t>Taller de base de datos</a:t>
+            </a:r>
+          </a:p>
+          <a:p>
+            <a:r>
+              <a:rPr lang="es-MX" dirty="0">
+                <a:solidFill>
+                  <a:srgbClr val="FFFFFF"/>
+                </a:solidFill>
+              </a:rPr>
+              <a:t>Ingeniería en sistemas computacionales</a:t>
+            </a:r>
+          </a:p>
+          <a:p>
             <a:endParaRPr lang="es-MX" dirty="0">
               <a:solidFill>
                 <a:srgbClr val="FFFFFF"/>
@@ -5646,6 +5961,129 @@
           </a:p>
         </p:txBody>
       </p:sp>
+      <p:pic>
+        <p:nvPicPr>
+          <p:cNvPr id="6" name="Imagen 5">
+            <a:extLst>
+              <a:ext uri="{FF2B5EF4-FFF2-40B4-BE49-F238E27FC236}">
+                <a16:creationId xmlns:a16="http://schemas.microsoft.com/office/drawing/2014/main" id="{808B1F65-F611-7525-8175-0BA0265F4D86}"/>
+              </a:ext>
+            </a:extLst>
+          </p:cNvPr>
+          <p:cNvPicPr>
+            <a:picLocks noChangeAspect="1"/>
+          </p:cNvPicPr>
+          <p:nvPr/>
+        </p:nvPicPr>
+        <p:blipFill>
+          <a:blip r:embed="rId3"/>
+          <a:stretch>
+            <a:fillRect/>
+          </a:stretch>
+        </p:blipFill>
+        <p:spPr>
+          <a:xfrm>
+            <a:off x="751535" y="349708"/>
+            <a:ext cx="2138516" cy="913508"/>
+          </a:xfrm>
+          <a:prstGeom prst="rect">
+            <a:avLst/>
+          </a:prstGeom>
+          <a:ln>
+            <a:noFill/>
+          </a:ln>
+          <a:effectLst>
+            <a:outerShdw blurRad="292100" dist="139700" dir="2700000" algn="tl" rotWithShape="0">
+              <a:srgbClr val="333333">
+                <a:alpha val="65000"/>
+              </a:srgbClr>
+            </a:outerShdw>
+          </a:effectLst>
+        </p:spPr>
+      </p:pic>
+      <p:pic>
+        <p:nvPicPr>
+          <p:cNvPr id="1028" name="Picture 4" descr="Insituto Tecnológico de Jiquilpan">
+            <a:extLst>
+              <a:ext uri="{FF2B5EF4-FFF2-40B4-BE49-F238E27FC236}">
+                <a16:creationId xmlns:a16="http://schemas.microsoft.com/office/drawing/2014/main" id="{00C43ED9-1FC8-4573-C22D-CF566D28EB04}"/>
+              </a:ext>
+            </a:extLst>
+          </p:cNvPr>
+          <p:cNvPicPr>
+            <a:picLocks noChangeAspect="1" noChangeArrowheads="1"/>
+          </p:cNvPicPr>
+          <p:nvPr/>
+        </p:nvPicPr>
+        <p:blipFill>
+          <a:blip r:embed="rId4">
+            <a:extLst>
+              <a:ext uri="{28A0092B-C50C-407E-A947-70E740481C1C}">
+                <a14:useLocalDpi xmlns:a14="http://schemas.microsoft.com/office/drawing/2010/main" val="0"/>
+              </a:ext>
+            </a:extLst>
+          </a:blip>
+          <a:srcRect/>
+          <a:stretch>
+            <a:fillRect/>
+          </a:stretch>
+        </p:blipFill>
+        <p:spPr bwMode="auto">
+          <a:xfrm>
+            <a:off x="9999534" y="200261"/>
+            <a:ext cx="1719032" cy="1781259"/>
+          </a:xfrm>
+          <a:prstGeom prst="rect">
+            <a:avLst/>
+          </a:prstGeom>
+          <a:noFill/>
+          <a:extLst>
+            <a:ext uri="{909E8E84-426E-40DD-AFC4-6F175D3DCCD1}">
+              <a14:hiddenFill xmlns:a14="http://schemas.microsoft.com/office/drawing/2010/main">
+                <a:solidFill>
+                  <a:srgbClr val="FFFFFF"/>
+                </a:solidFill>
+              </a14:hiddenFill>
+            </a:ext>
+          </a:extLst>
+        </p:spPr>
+      </p:pic>
+      <p:pic>
+        <p:nvPicPr>
+          <p:cNvPr id="7" name="Imagen 6" descr="Imagen que contiene Logotipo&#10;&#10;Descripción generada automáticamente">
+            <a:extLst>
+              <a:ext uri="{FF2B5EF4-FFF2-40B4-BE49-F238E27FC236}">
+                <a16:creationId xmlns:a16="http://schemas.microsoft.com/office/drawing/2014/main" id="{31498FE2-9059-F4DF-7BA0-B2659C2B2357}"/>
+              </a:ext>
+            </a:extLst>
+          </p:cNvPr>
+          <p:cNvPicPr>
+            <a:picLocks noChangeAspect="1"/>
+          </p:cNvPicPr>
+          <p:nvPr/>
+        </p:nvPicPr>
+        <p:blipFill>
+          <a:blip r:embed="rId5">
+            <a:extLst>
+              <a:ext uri="{28A0092B-C50C-407E-A947-70E740481C1C}">
+                <a14:useLocalDpi xmlns:a14="http://schemas.microsoft.com/office/drawing/2010/main" val="0"/>
+              </a:ext>
+            </a:extLst>
+          </a:blip>
+          <a:stretch>
+            <a:fillRect/>
+          </a:stretch>
+        </p:blipFill>
+        <p:spPr>
+          <a:xfrm>
+            <a:off x="4964230" y="1263216"/>
+            <a:ext cx="2260487" cy="2260487"/>
+          </a:xfrm>
+          <a:prstGeom prst="rect">
+            <a:avLst/>
+          </a:prstGeom>
+        </p:spPr>
+      </p:pic>
     </p:spTree>
     <p:extLst>
       <p:ext uri="{BB962C8B-B14F-4D97-AF65-F5344CB8AC3E}">
@@ -6135,6 +6573,404 @@
     <p:extLst>
       <p:ext uri="{BB962C8B-B14F-4D97-AF65-F5344CB8AC3E}">
         <p14:creationId xmlns:p14="http://schemas.microsoft.com/office/powerpoint/2010/main" val="2183696258"/>
+      </p:ext>
+    </p:extLst>
+  </p:cSld>
+  <p:clrMapOvr>
+    <a:masterClrMapping/>
+  </p:clrMapOvr>
+</p:sld>
+</file>
+
+<file path=ppt/slides/slide6.xml><?xml version="1.0" encoding="utf-8"?>
+<p:sld xmlns:a="http://schemas.openxmlformats.org/drawingml/2006/main" xmlns:r="http://schemas.openxmlformats.org/officeDocument/2006/relationships" xmlns:p="http://schemas.openxmlformats.org/presentationml/2006/main">
+  <p:cSld>
+    <p:spTree>
+      <p:nvGrpSpPr>
+        <p:cNvPr id="1" name=""/>
+        <p:cNvGrpSpPr/>
+        <p:nvPr/>
+      </p:nvGrpSpPr>
+      <p:grpSpPr>
+        <a:xfrm>
+          <a:off x="0" y="0"/>
+          <a:ext cx="0" cy="0"/>
+          <a:chOff x="0" y="0"/>
+          <a:chExt cx="0" cy="0"/>
+        </a:xfrm>
+      </p:grpSpPr>
+      <p:sp>
+        <p:nvSpPr>
+          <p:cNvPr id="2" name="Título 1">
+            <a:extLst>
+              <a:ext uri="{FF2B5EF4-FFF2-40B4-BE49-F238E27FC236}">
+                <a16:creationId xmlns:a16="http://schemas.microsoft.com/office/drawing/2014/main" id="{944ABC48-E922-D0E3-9CD7-CE98C240858E}"/>
+              </a:ext>
+            </a:extLst>
+          </p:cNvPr>
+          <p:cNvSpPr>
+            <a:spLocks noGrp="1"/>
+          </p:cNvSpPr>
+          <p:nvPr>
+            <p:ph type="title"/>
+          </p:nvPr>
+        </p:nvSpPr>
+        <p:spPr>
+          <a:xfrm>
+            <a:off x="766445" y="132736"/>
+            <a:ext cx="10659110" cy="1159746"/>
+          </a:xfrm>
+        </p:spPr>
+        <p:txBody>
+          <a:bodyPr/>
+          <a:lstStyle/>
+          <a:p>
+            <a:pPr algn="ctr"/>
+            <a:r>
+              <a:rPr lang="es-ES" dirty="0"/>
+              <a:t>Proceso de compras</a:t>
+            </a:r>
+            <a:endParaRPr lang="es-MX" dirty="0"/>
+          </a:p>
+        </p:txBody>
+      </p:sp>
+      <p:pic>
+        <p:nvPicPr>
+          <p:cNvPr id="5" name="Imagen 4" descr="Interfaz de usuario gráfica&#10;&#10;Descripción generada automáticamente">
+            <a:extLst>
+              <a:ext uri="{FF2B5EF4-FFF2-40B4-BE49-F238E27FC236}">
+                <a16:creationId xmlns:a16="http://schemas.microsoft.com/office/drawing/2014/main" id="{773CB2B1-46FC-940A-7D9A-3D24B7D691C6}"/>
+              </a:ext>
+            </a:extLst>
+          </p:cNvPr>
+          <p:cNvPicPr>
+            <a:picLocks noChangeAspect="1"/>
+          </p:cNvPicPr>
+          <p:nvPr/>
+        </p:nvPicPr>
+        <p:blipFill>
+          <a:blip r:embed="rId2">
+            <a:extLst>
+              <a:ext uri="{28A0092B-C50C-407E-A947-70E740481C1C}">
+                <a14:useLocalDpi xmlns:a14="http://schemas.microsoft.com/office/drawing/2010/main" val="0"/>
+              </a:ext>
+            </a:extLst>
+          </a:blip>
+          <a:stretch>
+            <a:fillRect/>
+          </a:stretch>
+        </p:blipFill>
+        <p:spPr>
+          <a:xfrm>
+            <a:off x="1403779" y="1183558"/>
+            <a:ext cx="9384441" cy="5305731"/>
+          </a:xfrm>
+          <a:prstGeom prst="rect">
+            <a:avLst/>
+          </a:prstGeom>
+        </p:spPr>
+      </p:pic>
+    </p:spTree>
+    <p:extLst>
+      <p:ext uri="{BB962C8B-B14F-4D97-AF65-F5344CB8AC3E}">
+        <p14:creationId xmlns:p14="http://schemas.microsoft.com/office/powerpoint/2010/main" val="4239439275"/>
+      </p:ext>
+    </p:extLst>
+  </p:cSld>
+  <p:clrMapOvr>
+    <a:masterClrMapping/>
+  </p:clrMapOvr>
+</p:sld>
+</file>
+
+<file path=ppt/slides/slide7.xml><?xml version="1.0" encoding="utf-8"?>
+<p:sld xmlns:a="http://schemas.openxmlformats.org/drawingml/2006/main" xmlns:r="http://schemas.openxmlformats.org/officeDocument/2006/relationships" xmlns:p="http://schemas.openxmlformats.org/presentationml/2006/main">
+  <p:cSld>
+    <p:spTree>
+      <p:nvGrpSpPr>
+        <p:cNvPr id="1" name=""/>
+        <p:cNvGrpSpPr/>
+        <p:nvPr/>
+      </p:nvGrpSpPr>
+      <p:grpSpPr>
+        <a:xfrm>
+          <a:off x="0" y="0"/>
+          <a:ext cx="0" cy="0"/>
+          <a:chOff x="0" y="0"/>
+          <a:chExt cx="0" cy="0"/>
+        </a:xfrm>
+      </p:grpSpPr>
+      <p:sp>
+        <p:nvSpPr>
+          <p:cNvPr id="2" name="Título 1">
+            <a:extLst>
+              <a:ext uri="{FF2B5EF4-FFF2-40B4-BE49-F238E27FC236}">
+                <a16:creationId xmlns:a16="http://schemas.microsoft.com/office/drawing/2014/main" id="{AF9A4D78-E717-8A56-63CF-BB70A04A3439}"/>
+              </a:ext>
+            </a:extLst>
+          </p:cNvPr>
+          <p:cNvSpPr>
+            <a:spLocks noGrp="1"/>
+          </p:cNvSpPr>
+          <p:nvPr>
+            <p:ph type="title"/>
+          </p:nvPr>
+        </p:nvSpPr>
+        <p:spPr>
+          <a:xfrm>
+            <a:off x="766445" y="250722"/>
+            <a:ext cx="10659110" cy="1027011"/>
+          </a:xfrm>
+        </p:spPr>
+        <p:txBody>
+          <a:bodyPr>
+            <a:normAutofit fontScale="90000"/>
+          </a:bodyPr>
+          <a:lstStyle/>
+          <a:p>
+            <a:pPr algn="ctr"/>
+            <a:r>
+              <a:rPr lang="es-ES" dirty="0"/>
+              <a:t>Proceso de devoluciones sobre compras</a:t>
+            </a:r>
+            <a:endParaRPr lang="es-MX" dirty="0"/>
+          </a:p>
+        </p:txBody>
+      </p:sp>
+      <p:pic>
+        <p:nvPicPr>
+          <p:cNvPr id="5" name="Imagen 4" descr="Interfaz de usuario gráfica&#10;&#10;Descripción generada automáticamente">
+            <a:extLst>
+              <a:ext uri="{FF2B5EF4-FFF2-40B4-BE49-F238E27FC236}">
+                <a16:creationId xmlns:a16="http://schemas.microsoft.com/office/drawing/2014/main" id="{0C80641C-1B45-A71B-D57B-5A7D2B2F0A00}"/>
+              </a:ext>
+            </a:extLst>
+          </p:cNvPr>
+          <p:cNvPicPr>
+            <a:picLocks noChangeAspect="1"/>
+          </p:cNvPicPr>
+          <p:nvPr/>
+        </p:nvPicPr>
+        <p:blipFill>
+          <a:blip r:embed="rId2">
+            <a:extLst>
+              <a:ext uri="{28A0092B-C50C-407E-A947-70E740481C1C}">
+                <a14:useLocalDpi xmlns:a14="http://schemas.microsoft.com/office/drawing/2010/main" val="0"/>
+              </a:ext>
+            </a:extLst>
+          </a:blip>
+          <a:stretch>
+            <a:fillRect/>
+          </a:stretch>
+        </p:blipFill>
+        <p:spPr>
+          <a:xfrm>
+            <a:off x="1491677" y="1277733"/>
+            <a:ext cx="9208645" cy="5172895"/>
+          </a:xfrm>
+          <a:prstGeom prst="rect">
+            <a:avLst/>
+          </a:prstGeom>
+        </p:spPr>
+      </p:pic>
+    </p:spTree>
+    <p:extLst>
+      <p:ext uri="{BB962C8B-B14F-4D97-AF65-F5344CB8AC3E}">
+        <p14:creationId xmlns:p14="http://schemas.microsoft.com/office/powerpoint/2010/main" val="3226838017"/>
+      </p:ext>
+    </p:extLst>
+  </p:cSld>
+  <p:clrMapOvr>
+    <a:masterClrMapping/>
+  </p:clrMapOvr>
+</p:sld>
+</file>
+
+<file path=ppt/slides/slide8.xml><?xml version="1.0" encoding="utf-8"?>
+<p:sld xmlns:a="http://schemas.openxmlformats.org/drawingml/2006/main" xmlns:r="http://schemas.openxmlformats.org/officeDocument/2006/relationships" xmlns:p="http://schemas.openxmlformats.org/presentationml/2006/main">
+  <p:cSld>
+    <p:spTree>
+      <p:nvGrpSpPr>
+        <p:cNvPr id="1" name=""/>
+        <p:cNvGrpSpPr/>
+        <p:nvPr/>
+      </p:nvGrpSpPr>
+      <p:grpSpPr>
+        <a:xfrm>
+          <a:off x="0" y="0"/>
+          <a:ext cx="0" cy="0"/>
+          <a:chOff x="0" y="0"/>
+          <a:chExt cx="0" cy="0"/>
+        </a:xfrm>
+      </p:grpSpPr>
+      <p:sp>
+        <p:nvSpPr>
+          <p:cNvPr id="2" name="Título 1">
+            <a:extLst>
+              <a:ext uri="{FF2B5EF4-FFF2-40B4-BE49-F238E27FC236}">
+                <a16:creationId xmlns:a16="http://schemas.microsoft.com/office/drawing/2014/main" id="{CFE054AA-D6C6-AB97-FC05-5259E4362795}"/>
+              </a:ext>
+            </a:extLst>
+          </p:cNvPr>
+          <p:cNvSpPr>
+            <a:spLocks noGrp="1"/>
+          </p:cNvSpPr>
+          <p:nvPr>
+            <p:ph type="title"/>
+          </p:nvPr>
+        </p:nvSpPr>
+        <p:spPr>
+          <a:xfrm>
+            <a:off x="777239" y="211393"/>
+            <a:ext cx="10659110" cy="835282"/>
+          </a:xfrm>
+        </p:spPr>
+        <p:txBody>
+          <a:bodyPr>
+            <a:normAutofit fontScale="90000"/>
+          </a:bodyPr>
+          <a:lstStyle/>
+          <a:p>
+            <a:pPr algn="ctr"/>
+            <a:r>
+              <a:rPr lang="es-ES" dirty="0"/>
+              <a:t>Proceso de ventas</a:t>
+            </a:r>
+            <a:endParaRPr lang="es-MX" dirty="0"/>
+          </a:p>
+        </p:txBody>
+      </p:sp>
+      <p:pic>
+        <p:nvPicPr>
+          <p:cNvPr id="5" name="Imagen 4" descr="Interfaz de usuario gráfica&#10;&#10;Descripción generada automáticamente">
+            <a:extLst>
+              <a:ext uri="{FF2B5EF4-FFF2-40B4-BE49-F238E27FC236}">
+                <a16:creationId xmlns:a16="http://schemas.microsoft.com/office/drawing/2014/main" id="{CB96B4A9-7AB4-A0AF-7821-B4D439747AA8}"/>
+              </a:ext>
+            </a:extLst>
+          </p:cNvPr>
+          <p:cNvPicPr>
+            <a:picLocks noChangeAspect="1"/>
+          </p:cNvPicPr>
+          <p:nvPr/>
+        </p:nvPicPr>
+        <p:blipFill>
+          <a:blip r:embed="rId2">
+            <a:extLst>
+              <a:ext uri="{28A0092B-C50C-407E-A947-70E740481C1C}">
+                <a14:useLocalDpi xmlns:a14="http://schemas.microsoft.com/office/drawing/2010/main" val="0"/>
+              </a:ext>
+            </a:extLst>
+          </a:blip>
+          <a:stretch>
+            <a:fillRect/>
+          </a:stretch>
+        </p:blipFill>
+        <p:spPr>
+          <a:xfrm>
+            <a:off x="1319304" y="943436"/>
+            <a:ext cx="9574979" cy="5354125"/>
+          </a:xfrm>
+          <a:prstGeom prst="rect">
+            <a:avLst/>
+          </a:prstGeom>
+        </p:spPr>
+      </p:pic>
+    </p:spTree>
+    <p:extLst>
+      <p:ext uri="{BB962C8B-B14F-4D97-AF65-F5344CB8AC3E}">
+        <p14:creationId xmlns:p14="http://schemas.microsoft.com/office/powerpoint/2010/main" val="3021259750"/>
+      </p:ext>
+    </p:extLst>
+  </p:cSld>
+  <p:clrMapOvr>
+    <a:masterClrMapping/>
+  </p:clrMapOvr>
+</p:sld>
+</file>
+
+<file path=ppt/slides/slide9.xml><?xml version="1.0" encoding="utf-8"?>
+<p:sld xmlns:a="http://schemas.openxmlformats.org/drawingml/2006/main" xmlns:r="http://schemas.openxmlformats.org/officeDocument/2006/relationships" xmlns:p="http://schemas.openxmlformats.org/presentationml/2006/main">
+  <p:cSld>
+    <p:spTree>
+      <p:nvGrpSpPr>
+        <p:cNvPr id="1" name=""/>
+        <p:cNvGrpSpPr/>
+        <p:nvPr/>
+      </p:nvGrpSpPr>
+      <p:grpSpPr>
+        <a:xfrm>
+          <a:off x="0" y="0"/>
+          <a:ext cx="0" cy="0"/>
+          <a:chOff x="0" y="0"/>
+          <a:chExt cx="0" cy="0"/>
+        </a:xfrm>
+      </p:grpSpPr>
+      <p:sp>
+        <p:nvSpPr>
+          <p:cNvPr id="2" name="Título 1">
+            <a:extLst>
+              <a:ext uri="{FF2B5EF4-FFF2-40B4-BE49-F238E27FC236}">
+                <a16:creationId xmlns:a16="http://schemas.microsoft.com/office/drawing/2014/main" id="{85627D23-272C-190D-D089-3237F2292163}"/>
+              </a:ext>
+            </a:extLst>
+          </p:cNvPr>
+          <p:cNvSpPr>
+            <a:spLocks noGrp="1"/>
+          </p:cNvSpPr>
+          <p:nvPr>
+            <p:ph type="title"/>
+          </p:nvPr>
+        </p:nvSpPr>
+        <p:spPr/>
+        <p:txBody>
+          <a:bodyPr/>
+          <a:lstStyle/>
+          <a:p>
+            <a:pPr algn="ctr"/>
+            <a:r>
+              <a:rPr lang="es-ES" dirty="0"/>
+              <a:t>Repositorio de GitHub</a:t>
+            </a:r>
+            <a:endParaRPr lang="es-MX" dirty="0"/>
+          </a:p>
+        </p:txBody>
+      </p:sp>
+      <p:sp>
+        <p:nvSpPr>
+          <p:cNvPr id="3" name="Marcador de contenido 2">
+            <a:extLst>
+              <a:ext uri="{FF2B5EF4-FFF2-40B4-BE49-F238E27FC236}">
+                <a16:creationId xmlns:a16="http://schemas.microsoft.com/office/drawing/2014/main" id="{676F03D8-D18E-3842-A3F3-0EF058E57423}"/>
+              </a:ext>
+            </a:extLst>
+          </p:cNvPr>
+          <p:cNvSpPr>
+            <a:spLocks noGrp="1"/>
+          </p:cNvSpPr>
+          <p:nvPr>
+            <p:ph idx="1"/>
+          </p:nvPr>
+        </p:nvSpPr>
+        <p:spPr/>
+        <p:txBody>
+          <a:bodyPr/>
+          <a:lstStyle/>
+          <a:p>
+            <a:pPr marL="0" indent="0" algn="ctr">
+              <a:buNone/>
+            </a:pPr>
+            <a:r>
+              <a:rPr lang="es-MX" dirty="0"/>
+              <a:t>https://github.com/Santibanez-22420423/Taller-de-base-de-datos-La-casa-del-t-.git</a:t>
+            </a:r>
+          </a:p>
+        </p:txBody>
+      </p:sp>
+    </p:spTree>
+    <p:extLst>
+      <p:ext uri="{BB962C8B-B14F-4D97-AF65-F5344CB8AC3E}">
+        <p14:creationId xmlns:p14="http://schemas.microsoft.com/office/powerpoint/2010/main" val="1992406026"/>
       </p:ext>
     </p:extLst>
   </p:cSld>

</xml_diff>